<commit_message>
Final presentation slightly changed
</commit_message>
<xml_diff>
--- a/docs/TeamKeterFinalPresentation.pptx
+++ b/docs/TeamKeterFinalPresentation.pptx
@@ -302,7 +302,7 @@
           <a:p>
             <a:fld id="{F510EC27-B8AC-43BC-BE9B-2AD4C590ADD7}" type="datetimeFigureOut">
               <a:rPr lang="ko-KR" altLang="en-US" smtClean="0"/>
-              <a:t>2016-07-26</a:t>
+              <a:t>2016-07-27</a:t>
             </a:fld>
             <a:endParaRPr lang="ko-KR" altLang="en-US"/>
           </a:p>
@@ -472,7 +472,7 @@
           <a:p>
             <a:fld id="{F510EC27-B8AC-43BC-BE9B-2AD4C590ADD7}" type="datetimeFigureOut">
               <a:rPr lang="ko-KR" altLang="en-US" smtClean="0"/>
-              <a:t>2016-07-26</a:t>
+              <a:t>2016-07-27</a:t>
             </a:fld>
             <a:endParaRPr lang="ko-KR" altLang="en-US"/>
           </a:p>
@@ -652,7 +652,7 @@
           <a:p>
             <a:fld id="{F510EC27-B8AC-43BC-BE9B-2AD4C590ADD7}" type="datetimeFigureOut">
               <a:rPr lang="ko-KR" altLang="en-US" smtClean="0"/>
-              <a:t>2016-07-26</a:t>
+              <a:t>2016-07-27</a:t>
             </a:fld>
             <a:endParaRPr lang="ko-KR" altLang="en-US"/>
           </a:p>
@@ -822,7 +822,7 @@
           <a:p>
             <a:fld id="{F510EC27-B8AC-43BC-BE9B-2AD4C590ADD7}" type="datetimeFigureOut">
               <a:rPr lang="ko-KR" altLang="en-US" smtClean="0"/>
-              <a:t>2016-07-26</a:t>
+              <a:t>2016-07-27</a:t>
             </a:fld>
             <a:endParaRPr lang="ko-KR" altLang="en-US"/>
           </a:p>
@@ -1068,7 +1068,7 @@
           <a:p>
             <a:fld id="{F510EC27-B8AC-43BC-BE9B-2AD4C590ADD7}" type="datetimeFigureOut">
               <a:rPr lang="ko-KR" altLang="en-US" smtClean="0"/>
-              <a:t>2016-07-26</a:t>
+              <a:t>2016-07-27</a:t>
             </a:fld>
             <a:endParaRPr lang="ko-KR" altLang="en-US"/>
           </a:p>
@@ -1356,7 +1356,7 @@
           <a:p>
             <a:fld id="{F510EC27-B8AC-43BC-BE9B-2AD4C590ADD7}" type="datetimeFigureOut">
               <a:rPr lang="ko-KR" altLang="en-US" smtClean="0"/>
-              <a:t>2016-07-26</a:t>
+              <a:t>2016-07-27</a:t>
             </a:fld>
             <a:endParaRPr lang="ko-KR" altLang="en-US"/>
           </a:p>
@@ -1778,7 +1778,7 @@
           <a:p>
             <a:fld id="{F510EC27-B8AC-43BC-BE9B-2AD4C590ADD7}" type="datetimeFigureOut">
               <a:rPr lang="ko-KR" altLang="en-US" smtClean="0"/>
-              <a:t>2016-07-26</a:t>
+              <a:t>2016-07-27</a:t>
             </a:fld>
             <a:endParaRPr lang="ko-KR" altLang="en-US"/>
           </a:p>
@@ -1896,7 +1896,7 @@
           <a:p>
             <a:fld id="{F510EC27-B8AC-43BC-BE9B-2AD4C590ADD7}" type="datetimeFigureOut">
               <a:rPr lang="ko-KR" altLang="en-US" smtClean="0"/>
-              <a:t>2016-07-26</a:t>
+              <a:t>2016-07-27</a:t>
             </a:fld>
             <a:endParaRPr lang="ko-KR" altLang="en-US"/>
           </a:p>
@@ -1991,7 +1991,7 @@
           <a:p>
             <a:fld id="{F510EC27-B8AC-43BC-BE9B-2AD4C590ADD7}" type="datetimeFigureOut">
               <a:rPr lang="ko-KR" altLang="en-US" smtClean="0"/>
-              <a:t>2016-07-26</a:t>
+              <a:t>2016-07-27</a:t>
             </a:fld>
             <a:endParaRPr lang="ko-KR" altLang="en-US"/>
           </a:p>
@@ -2268,7 +2268,7 @@
           <a:p>
             <a:fld id="{F510EC27-B8AC-43BC-BE9B-2AD4C590ADD7}" type="datetimeFigureOut">
               <a:rPr lang="ko-KR" altLang="en-US" smtClean="0"/>
-              <a:t>2016-07-26</a:t>
+              <a:t>2016-07-27</a:t>
             </a:fld>
             <a:endParaRPr lang="ko-KR" altLang="en-US"/>
           </a:p>
@@ -2521,7 +2521,7 @@
           <a:p>
             <a:fld id="{F510EC27-B8AC-43BC-BE9B-2AD4C590ADD7}" type="datetimeFigureOut">
               <a:rPr lang="ko-KR" altLang="en-US" smtClean="0"/>
-              <a:t>2016-07-26</a:t>
+              <a:t>2016-07-27</a:t>
             </a:fld>
             <a:endParaRPr lang="ko-KR" altLang="en-US"/>
           </a:p>
@@ -2734,7 +2734,7 @@
           <a:p>
             <a:fld id="{F510EC27-B8AC-43BC-BE9B-2AD4C590ADD7}" type="datetimeFigureOut">
               <a:rPr lang="ko-KR" altLang="en-US" smtClean="0"/>
-              <a:t>2016-07-26</a:t>
+              <a:t>2016-07-27</a:t>
             </a:fld>
             <a:endParaRPr lang="ko-KR" altLang="en-US"/>
           </a:p>
@@ -3256,21 +3256,35 @@
                 <a:latin typeface="Arial" panose="020B0604020202020204" pitchFamily="34" charset="0"/>
                 <a:cs typeface="Arial" panose="020B0604020202020204" pitchFamily="34" charset="0"/>
               </a:rPr>
-              <a:t>Yang Se-</a:t>
+              <a:t>Yang </a:t>
+            </a:r>
+            <a:r>
+              <a:rPr lang="en-US" altLang="ko-KR" sz="2400" dirty="0" smtClean="0">
+                <a:latin typeface="Arial" panose="020B0604020202020204" pitchFamily="34" charset="0"/>
+                <a:cs typeface="Arial" panose="020B0604020202020204" pitchFamily="34" charset="0"/>
+              </a:rPr>
+              <a:t>Se-</a:t>
             </a:r>
             <a:r>
               <a:rPr lang="en-US" altLang="ko-KR" sz="2400" dirty="0" err="1" smtClean="0">
                 <a:latin typeface="Arial" panose="020B0604020202020204" pitchFamily="34" charset="0"/>
                 <a:cs typeface="Arial" panose="020B0604020202020204" pitchFamily="34" charset="0"/>
               </a:rPr>
-              <a:t>hoon</a:t>
+              <a:t>Hoon</a:t>
             </a:r>
             <a:r>
               <a:rPr lang="en-US" altLang="ko-KR" sz="2400" dirty="0" smtClean="0">
                 <a:latin typeface="Arial" panose="020B0604020202020204" pitchFamily="34" charset="0"/>
                 <a:cs typeface="Arial" panose="020B0604020202020204" pitchFamily="34" charset="0"/>
               </a:rPr>
-              <a:t>(PO)</a:t>
+              <a:t>(PO</a:t>
+            </a:r>
+            <a:r>
+              <a:rPr lang="en-US" altLang="ko-KR" sz="2400" dirty="0" smtClean="0">
+                <a:latin typeface="Arial" panose="020B0604020202020204" pitchFamily="34" charset="0"/>
+                <a:cs typeface="Arial" panose="020B0604020202020204" pitchFamily="34" charset="0"/>
+              </a:rPr>
+              <a:t>)</a:t>
             </a:r>
           </a:p>
           <a:p>
@@ -3283,14 +3297,21 @@
                 <a:latin typeface="Arial" panose="020B0604020202020204" pitchFamily="34" charset="0"/>
                 <a:cs typeface="Arial" panose="020B0604020202020204" pitchFamily="34" charset="0"/>
               </a:rPr>
-              <a:t>SooYoung</a:t>
+              <a:t>Sooyoung</a:t>
             </a:r>
             <a:r>
               <a:rPr lang="en-US" altLang="ko-KR" sz="2400" dirty="0" smtClean="0">
                 <a:latin typeface="Arial" panose="020B0604020202020204" pitchFamily="34" charset="0"/>
                 <a:cs typeface="Arial" panose="020B0604020202020204" pitchFamily="34" charset="0"/>
               </a:rPr>
-              <a:t> Park</a:t>
+              <a:t> </a:t>
+            </a:r>
+            <a:r>
+              <a:rPr lang="en-US" altLang="ko-KR" sz="2400" dirty="0" smtClean="0">
+                <a:latin typeface="Arial" panose="020B0604020202020204" pitchFamily="34" charset="0"/>
+                <a:cs typeface="Arial" panose="020B0604020202020204" pitchFamily="34" charset="0"/>
+              </a:rPr>
+              <a:t>Park</a:t>
             </a:r>
           </a:p>
           <a:p>

</xml_diff>